<commit_message>
se quitaron datos innecesarios de la documentacion
</commit_message>
<xml_diff>
--- a/# Documentation/Información técnica.pptx
+++ b/# Documentation/Información técnica.pptx
@@ -210,7 +210,7 @@
           <a:p>
             <a:fld id="{8F741D12-1BA0-4D16-B253-39E4DA7AD69F}" type="datetimeFigureOut">
               <a:rPr lang="en-US" smtClean="0"/>
-              <a:t>1/16/2021</a:t>
+              <a:t>1/19/2022</a:t>
             </a:fld>
             <a:endParaRPr lang="en-US"/>
           </a:p>
@@ -375,7 +375,7 @@
           <a:p>
             <a:fld id="{DBD0E036-A0EF-40EA-AC2B-818A5F8CFC1C}" type="datetimeFigureOut">
               <a:rPr lang="en-US" smtClean="0"/>
-              <a:t>1/16/2021</a:t>
+              <a:t>1/19/2022</a:t>
             </a:fld>
             <a:endParaRPr lang="en-US"/>
           </a:p>
@@ -1190,7 +1190,7 @@
           <a:p>
             <a:fld id="{DA08AD9C-B2AB-4742-B9D5-88A1B5443D17}" type="datetime1">
               <a:rPr lang="en-US" smtClean="0"/>
-              <a:t>1/16/2021</a:t>
+              <a:t>1/19/2022</a:t>
             </a:fld>
             <a:endParaRPr lang="en-US"/>
           </a:p>
@@ -1374,7 +1374,7 @@
           <a:p>
             <a:fld id="{3ABD6FAA-2408-45A7-869F-2014C214FC1D}" type="datetime1">
               <a:rPr lang="en-US" smtClean="0"/>
-              <a:t>1/16/2021</a:t>
+              <a:t>1/19/2022</a:t>
             </a:fld>
             <a:endParaRPr lang="en-US"/>
           </a:p>
@@ -1568,7 +1568,7 @@
           <a:p>
             <a:fld id="{520D00D2-426F-4F92-907F-34BAC1037045}" type="datetime1">
               <a:rPr lang="en-US" smtClean="0"/>
-              <a:t>1/16/2021</a:t>
+              <a:t>1/19/2022</a:t>
             </a:fld>
             <a:endParaRPr lang="en-US"/>
           </a:p>
@@ -1769,7 +1769,7 @@
           <a:p>
             <a:fld id="{CF0A1930-6C43-4E8F-9426-A3A84C496FC0}" type="datetime1">
               <a:rPr lang="en-US" smtClean="0"/>
-              <a:t>1/16/2021</a:t>
+              <a:t>1/19/2022</a:t>
             </a:fld>
             <a:endParaRPr lang="en-US"/>
           </a:p>
@@ -2008,7 +2008,7 @@
           <a:p>
             <a:fld id="{DDF117CD-D39E-4644-9F4A-FCA0A2101615}" type="datetime1">
               <a:rPr lang="en-US" smtClean="0"/>
-              <a:t>1/16/2021</a:t>
+              <a:t>1/19/2022</a:t>
             </a:fld>
             <a:endParaRPr lang="en-US"/>
           </a:p>
@@ -2309,7 +2309,7 @@
           <a:p>
             <a:fld id="{BA0D1651-45E6-4A2C-99B8-82F921298F2D}" type="datetime1">
               <a:rPr lang="en-US" smtClean="0"/>
-              <a:t>1/16/2021</a:t>
+              <a:t>1/19/2022</a:t>
             </a:fld>
             <a:endParaRPr lang="en-US"/>
           </a:p>
@@ -2745,7 +2745,7 @@
           <a:p>
             <a:fld id="{B59806B7-6F8B-402A-A5AA-EC8CCA413C89}" type="datetime1">
               <a:rPr lang="en-US" smtClean="0"/>
-              <a:t>1/16/2021</a:t>
+              <a:t>1/19/2022</a:t>
             </a:fld>
             <a:endParaRPr lang="en-US"/>
           </a:p>
@@ -2878,7 +2878,7 @@
           <a:p>
             <a:fld id="{EAA48042-1CDC-4A3A-9348-8618A3117C5A}" type="datetime1">
               <a:rPr lang="en-US" smtClean="0"/>
-              <a:t>1/16/2021</a:t>
+              <a:t>1/19/2022</a:t>
             </a:fld>
             <a:endParaRPr lang="en-US"/>
           </a:p>
@@ -2989,7 +2989,7 @@
           <a:p>
             <a:fld id="{9EFA7805-3287-4562-914A-E3154CDB99E0}" type="datetime1">
               <a:rPr lang="en-US" smtClean="0"/>
-              <a:t>1/16/2021</a:t>
+              <a:t>1/19/2022</a:t>
             </a:fld>
             <a:endParaRPr lang="en-US"/>
           </a:p>
@@ -3281,7 +3281,7 @@
           <a:p>
             <a:fld id="{95486D92-D8A0-4DA7-91C7-7D40AE100B92}" type="datetime1">
               <a:rPr lang="en-US" smtClean="0"/>
-              <a:t>1/16/2021</a:t>
+              <a:t>1/19/2022</a:t>
             </a:fld>
             <a:endParaRPr lang="en-US"/>
           </a:p>
@@ -3552,7 +3552,7 @@
           <a:p>
             <a:fld id="{A9C6CC7D-996C-4D51-8355-44BC67D378B3}" type="datetime1">
               <a:rPr lang="en-US" smtClean="0"/>
-              <a:t>1/16/2021</a:t>
+              <a:t>1/19/2022</a:t>
             </a:fld>
             <a:endParaRPr lang="en-US"/>
           </a:p>
@@ -4071,7 +4071,7 @@
           <a:p>
             <a:fld id="{C0346F80-965E-4784-B7D3-29765BD94027}" type="datetime1">
               <a:rPr lang="en-US" smtClean="0"/>
-              <a:t>1/16/2021</a:t>
+              <a:t>1/19/2022</a:t>
             </a:fld>
             <a:endParaRPr lang="en-US"/>
           </a:p>
@@ -4632,7 +4632,7 @@
         </p:spPr>
         <p:txBody>
           <a:bodyPr>
-            <a:normAutofit lnSpcReduction="10000"/>
+            <a:normAutofit/>
           </a:bodyPr>
           <a:lstStyle/>
           <a:p>
@@ -4646,17 +4646,8 @@
               <a:rPr lang="es-PE" dirty="0">
                 <a:latin typeface="Jellyka CuttyCupcakes" panose="02000500000000000000" pitchFamily="2" charset="0"/>
               </a:rPr>
-              <a:t>SebastiánEPH and </a:t>
-            </a:r>
-            <a:r>
-              <a:rPr lang="es-PE" dirty="0" err="1">
-                <a:latin typeface="Jellyka CuttyCupcakes" panose="02000500000000000000" pitchFamily="2" charset="0"/>
-              </a:rPr>
-              <a:t>JosueChuqui</a:t>
-            </a:r>
-            <a:endParaRPr lang="es-PE" dirty="0">
-              <a:latin typeface="Jellyka CuttyCupcakes" panose="02000500000000000000" pitchFamily="2" charset="0"/>
-            </a:endParaRPr>
+              <a:t>SebastiánEPH</a:t>
+            </a:r>
           </a:p>
         </p:txBody>
       </p:sp>

</xml_diff>

<commit_message>
se cambiaron datos de la documentacion
</commit_message>
<xml_diff>
--- a/# Documentation/Información técnica.pptx
+++ b/# Documentation/Información técnica.pptx
@@ -210,7 +210,7 @@
           <a:p>
             <a:fld id="{8F741D12-1BA0-4D16-B253-39E4DA7AD69F}" type="datetimeFigureOut">
               <a:rPr lang="en-US" smtClean="0"/>
-              <a:t>1/19/2022</a:t>
+              <a:t>1/22/2022</a:t>
             </a:fld>
             <a:endParaRPr lang="en-US"/>
           </a:p>
@@ -375,7 +375,7 @@
           <a:p>
             <a:fld id="{DBD0E036-A0EF-40EA-AC2B-818A5F8CFC1C}" type="datetimeFigureOut">
               <a:rPr lang="en-US" smtClean="0"/>
-              <a:t>1/19/2022</a:t>
+              <a:t>1/22/2022</a:t>
             </a:fld>
             <a:endParaRPr lang="en-US"/>
           </a:p>
@@ -1190,7 +1190,7 @@
           <a:p>
             <a:fld id="{DA08AD9C-B2AB-4742-B9D5-88A1B5443D17}" type="datetime1">
               <a:rPr lang="en-US" smtClean="0"/>
-              <a:t>1/19/2022</a:t>
+              <a:t>1/22/2022</a:t>
             </a:fld>
             <a:endParaRPr lang="en-US"/>
           </a:p>
@@ -1374,7 +1374,7 @@
           <a:p>
             <a:fld id="{3ABD6FAA-2408-45A7-869F-2014C214FC1D}" type="datetime1">
               <a:rPr lang="en-US" smtClean="0"/>
-              <a:t>1/19/2022</a:t>
+              <a:t>1/22/2022</a:t>
             </a:fld>
             <a:endParaRPr lang="en-US"/>
           </a:p>
@@ -1568,7 +1568,7 @@
           <a:p>
             <a:fld id="{520D00D2-426F-4F92-907F-34BAC1037045}" type="datetime1">
               <a:rPr lang="en-US" smtClean="0"/>
-              <a:t>1/19/2022</a:t>
+              <a:t>1/22/2022</a:t>
             </a:fld>
             <a:endParaRPr lang="en-US"/>
           </a:p>
@@ -1769,7 +1769,7 @@
           <a:p>
             <a:fld id="{CF0A1930-6C43-4E8F-9426-A3A84C496FC0}" type="datetime1">
               <a:rPr lang="en-US" smtClean="0"/>
-              <a:t>1/19/2022</a:t>
+              <a:t>1/22/2022</a:t>
             </a:fld>
             <a:endParaRPr lang="en-US"/>
           </a:p>
@@ -2008,7 +2008,7 @@
           <a:p>
             <a:fld id="{DDF117CD-D39E-4644-9F4A-FCA0A2101615}" type="datetime1">
               <a:rPr lang="en-US" smtClean="0"/>
-              <a:t>1/19/2022</a:t>
+              <a:t>1/22/2022</a:t>
             </a:fld>
             <a:endParaRPr lang="en-US"/>
           </a:p>
@@ -2309,7 +2309,7 @@
           <a:p>
             <a:fld id="{BA0D1651-45E6-4A2C-99B8-82F921298F2D}" type="datetime1">
               <a:rPr lang="en-US" smtClean="0"/>
-              <a:t>1/19/2022</a:t>
+              <a:t>1/22/2022</a:t>
             </a:fld>
             <a:endParaRPr lang="en-US"/>
           </a:p>
@@ -2745,7 +2745,7 @@
           <a:p>
             <a:fld id="{B59806B7-6F8B-402A-A5AA-EC8CCA413C89}" type="datetime1">
               <a:rPr lang="en-US" smtClean="0"/>
-              <a:t>1/19/2022</a:t>
+              <a:t>1/22/2022</a:t>
             </a:fld>
             <a:endParaRPr lang="en-US"/>
           </a:p>
@@ -2878,7 +2878,7 @@
           <a:p>
             <a:fld id="{EAA48042-1CDC-4A3A-9348-8618A3117C5A}" type="datetime1">
               <a:rPr lang="en-US" smtClean="0"/>
-              <a:t>1/19/2022</a:t>
+              <a:t>1/22/2022</a:t>
             </a:fld>
             <a:endParaRPr lang="en-US"/>
           </a:p>
@@ -2989,7 +2989,7 @@
           <a:p>
             <a:fld id="{9EFA7805-3287-4562-914A-E3154CDB99E0}" type="datetime1">
               <a:rPr lang="en-US" smtClean="0"/>
-              <a:t>1/19/2022</a:t>
+              <a:t>1/22/2022</a:t>
             </a:fld>
             <a:endParaRPr lang="en-US"/>
           </a:p>
@@ -3281,7 +3281,7 @@
           <a:p>
             <a:fld id="{95486D92-D8A0-4DA7-91C7-7D40AE100B92}" type="datetime1">
               <a:rPr lang="en-US" smtClean="0"/>
-              <a:t>1/19/2022</a:t>
+              <a:t>1/22/2022</a:t>
             </a:fld>
             <a:endParaRPr lang="en-US"/>
           </a:p>
@@ -3552,7 +3552,7 @@
           <a:p>
             <a:fld id="{A9C6CC7D-996C-4D51-8355-44BC67D378B3}" type="datetime1">
               <a:rPr lang="en-US" smtClean="0"/>
-              <a:t>1/19/2022</a:t>
+              <a:t>1/22/2022</a:t>
             </a:fld>
             <a:endParaRPr lang="en-US"/>
           </a:p>
@@ -4071,7 +4071,7 @@
           <a:p>
             <a:fld id="{C0346F80-965E-4784-B7D3-29765BD94027}" type="datetime1">
               <a:rPr lang="en-US" smtClean="0"/>
-              <a:t>1/19/2022</a:t>
+              <a:t>1/22/2022</a:t>
             </a:fld>
             <a:endParaRPr lang="en-US"/>
           </a:p>
@@ -4632,10 +4632,11 @@
         </p:spPr>
         <p:txBody>
           <a:bodyPr>
-            <a:normAutofit/>
+            <a:normAutofit lnSpcReduction="10000"/>
           </a:bodyPr>
           <a:lstStyle/>
           <a:p>
+            <a:pPr algn="r"/>
             <a:r>
               <a:rPr lang="en-US" dirty="0">
                 <a:latin typeface="Jellyka CuttyCupcakes" panose="02000500000000000000" pitchFamily="2" charset="0"/>

</xml_diff>